<commit_message>
now client and admin parts are fully functional
</commit_message>
<xml_diff>
--- a/conception/Présentation .pptx
+++ b/conception/Présentation .pptx
@@ -5,26 +5,23 @@
     <p:sldMasterId id="2147483648" r:id="rId1"/>
   </p:sldMasterIdLst>
   <p:notesMasterIdLst>
-    <p:notesMasterId r:id="rId9"/>
+    <p:notesMasterId r:id="rId10"/>
   </p:notesMasterIdLst>
   <p:sldIdLst>
     <p:sldId id="256" r:id="rId2"/>
     <p:sldId id="259" r:id="rId3"/>
-    <p:sldId id="258" r:id="rId4"/>
-    <p:sldId id="257" r:id="rId5"/>
-    <p:sldId id="260" r:id="rId6"/>
-    <p:sldId id="261" r:id="rId7"/>
-    <p:sldId id="262" r:id="rId8"/>
+    <p:sldId id="263" r:id="rId4"/>
+    <p:sldId id="258" r:id="rId5"/>
+    <p:sldId id="257" r:id="rId6"/>
+    <p:sldId id="260" r:id="rId7"/>
+    <p:sldId id="261" r:id="rId8"/>
+    <p:sldId id="262" r:id="rId9"/>
   </p:sldIdLst>
   <p:sldSz cx="18288000" cy="10287000"/>
   <p:notesSz cx="6858000" cy="9144000"/>
   <p:embeddedFontLst>
     <p:embeddedFont>
       <p:font typeface="Open Sans" panose="020B0604020202020204" charset="0"/>
-      <p:regular r:id="rId10"/>
-    </p:embeddedFont>
-    <p:embeddedFont>
-      <p:font typeface="DM Sans Bold" panose="020B0604020202020204" charset="0"/>
       <p:regular r:id="rId11"/>
     </p:embeddedFont>
     <p:embeddedFont>
@@ -32,11 +29,15 @@
       <p:regular r:id="rId12"/>
     </p:embeddedFont>
     <p:embeddedFont>
+      <p:font typeface="DM Sans Bold" panose="020B0604020202020204" charset="0"/>
+      <p:regular r:id="rId13"/>
+    </p:embeddedFont>
+    <p:embeddedFont>
       <p:font typeface="Calibri" panose="020F0502020204030204" pitchFamily="34" charset="0"/>
-      <p:regular r:id="rId13"/>
-      <p:bold r:id="rId14"/>
-      <p:italic r:id="rId15"/>
-      <p:boldItalic r:id="rId16"/>
+      <p:regular r:id="rId14"/>
+      <p:bold r:id="rId15"/>
+      <p:italic r:id="rId16"/>
+      <p:boldItalic r:id="rId17"/>
     </p:embeddedFont>
   </p:embeddedFontLst>
   <p:defaultTextStyle>
@@ -235,7 +236,7 @@
           <a:p>
             <a:fld id="{8452DB11-4ADA-4289-85AB-B705889FB06F}" type="datetimeFigureOut">
               <a:rPr lang="fr-FR" smtClean="0"/>
-              <a:t>25/05/2022</a:t>
+              <a:t>17/06/2022</a:t>
             </a:fld>
             <a:endParaRPr lang="fr-FR"/>
           </a:p>
@@ -660,7 +661,7 @@
           <a:p>
             <a:fld id="{67D252D4-74C5-4FE6-86DA-4890222F9DF7}" type="slidenum">
               <a:rPr lang="fr-FR" smtClean="0"/>
-              <a:t>7</a:t>
+              <a:t>8</a:t>
             </a:fld>
             <a:endParaRPr lang="fr-FR"/>
           </a:p>
@@ -861,7 +862,7 @@
             <a:fld id="{1D8BD707-D9CF-40AE-B4C6-C98DA3205C09}" type="datetimeFigureOut">
               <a:rPr lang="en-US" smtClean="0"/>
               <a:pPr/>
-              <a:t>5/25/2022</a:t>
+              <a:t>6/17/2022</a:t>
             </a:fld>
             <a:endParaRPr lang="en-US"/>
           </a:p>
@@ -1028,7 +1029,7 @@
             <a:fld id="{1D8BD707-D9CF-40AE-B4C6-C98DA3205C09}" type="datetimeFigureOut">
               <a:rPr lang="en-US" smtClean="0"/>
               <a:pPr/>
-              <a:t>5/25/2022</a:t>
+              <a:t>6/17/2022</a:t>
             </a:fld>
             <a:endParaRPr lang="en-US"/>
           </a:p>
@@ -1205,7 +1206,7 @@
             <a:fld id="{1D8BD707-D9CF-40AE-B4C6-C98DA3205C09}" type="datetimeFigureOut">
               <a:rPr lang="en-US" smtClean="0"/>
               <a:pPr/>
-              <a:t>5/25/2022</a:t>
+              <a:t>6/17/2022</a:t>
             </a:fld>
             <a:endParaRPr lang="en-US"/>
           </a:p>
@@ -1372,7 +1373,7 @@
             <a:fld id="{1D8BD707-D9CF-40AE-B4C6-C98DA3205C09}" type="datetimeFigureOut">
               <a:rPr lang="en-US" smtClean="0"/>
               <a:pPr/>
-              <a:t>5/25/2022</a:t>
+              <a:t>6/17/2022</a:t>
             </a:fld>
             <a:endParaRPr lang="en-US"/>
           </a:p>
@@ -1615,7 +1616,7 @@
             <a:fld id="{1D8BD707-D9CF-40AE-B4C6-C98DA3205C09}" type="datetimeFigureOut">
               <a:rPr lang="en-US" smtClean="0"/>
               <a:pPr/>
-              <a:t>5/25/2022</a:t>
+              <a:t>6/17/2022</a:t>
             </a:fld>
             <a:endParaRPr lang="en-US"/>
           </a:p>
@@ -1900,7 +1901,7 @@
             <a:fld id="{1D8BD707-D9CF-40AE-B4C6-C98DA3205C09}" type="datetimeFigureOut">
               <a:rPr lang="en-US" smtClean="0"/>
               <a:pPr/>
-              <a:t>5/25/2022</a:t>
+              <a:t>6/17/2022</a:t>
             </a:fld>
             <a:endParaRPr lang="en-US"/>
           </a:p>
@@ -2319,7 +2320,7 @@
             <a:fld id="{1D8BD707-D9CF-40AE-B4C6-C98DA3205C09}" type="datetimeFigureOut">
               <a:rPr lang="en-US" smtClean="0"/>
               <a:pPr/>
-              <a:t>5/25/2022</a:t>
+              <a:t>6/17/2022</a:t>
             </a:fld>
             <a:endParaRPr lang="en-US"/>
           </a:p>
@@ -2434,7 +2435,7 @@
             <a:fld id="{1D8BD707-D9CF-40AE-B4C6-C98DA3205C09}" type="datetimeFigureOut">
               <a:rPr lang="en-US" smtClean="0"/>
               <a:pPr/>
-              <a:t>5/25/2022</a:t>
+              <a:t>6/17/2022</a:t>
             </a:fld>
             <a:endParaRPr lang="en-US"/>
           </a:p>
@@ -2526,7 +2527,7 @@
             <a:fld id="{1D8BD707-D9CF-40AE-B4C6-C98DA3205C09}" type="datetimeFigureOut">
               <a:rPr lang="en-US" smtClean="0"/>
               <a:pPr/>
-              <a:t>5/25/2022</a:t>
+              <a:t>6/17/2022</a:t>
             </a:fld>
             <a:endParaRPr lang="en-US"/>
           </a:p>
@@ -2800,7 +2801,7 @@
             <a:fld id="{1D8BD707-D9CF-40AE-B4C6-C98DA3205C09}" type="datetimeFigureOut">
               <a:rPr lang="en-US" smtClean="0"/>
               <a:pPr/>
-              <a:t>5/25/2022</a:t>
+              <a:t>6/17/2022</a:t>
             </a:fld>
             <a:endParaRPr lang="en-US"/>
           </a:p>
@@ -3050,7 +3051,7 @@
             <a:fld id="{1D8BD707-D9CF-40AE-B4C6-C98DA3205C09}" type="datetimeFigureOut">
               <a:rPr lang="en-US" smtClean="0"/>
               <a:pPr/>
-              <a:t>5/25/2022</a:t>
+              <a:t>6/17/2022</a:t>
             </a:fld>
             <a:endParaRPr lang="en-US"/>
           </a:p>
@@ -3260,7 +3261,7 @@
             <a:fld id="{1D8BD707-D9CF-40AE-B4C6-C98DA3205C09}" type="datetimeFigureOut">
               <a:rPr lang="en-US" smtClean="0"/>
               <a:pPr/>
-              <a:t>5/25/2022</a:t>
+              <a:t>6/17/2022</a:t>
             </a:fld>
             <a:endParaRPr lang="en-US"/>
           </a:p>
@@ -3646,7 +3647,7 @@
                 <a14:useLocalDpi xmlns:a14="http://schemas.microsoft.com/office/drawing/2010/main" val="0"/>
               </a:ext>
               <a:ext uri="{96DAC541-7B7A-43D3-8B79-37D633B846F1}">
-                <asvg:svgBlip xmlns:asvg="http://schemas.microsoft.com/office/drawing/2016/SVG/main" xmlns="" r:embed="rId4"/>
+                <asvg:svgBlip xmlns="" xmlns:asvg="http://schemas.microsoft.com/office/drawing/2016/SVG/main" r:embed="rId4"/>
               </a:ext>
             </a:extLst>
           </a:blip>
@@ -3891,8 +3892,8 @@
         </p:nvGrpSpPr>
         <p:grpSpPr>
           <a:xfrm>
-            <a:off x="9715770" y="3342614"/>
-            <a:ext cx="6563309" cy="875633"/>
+            <a:off x="9554818" y="2019335"/>
+            <a:ext cx="6724262" cy="875633"/>
             <a:chOff x="0" y="0"/>
             <a:chExt cx="8751079" cy="1167510"/>
           </a:xfrm>
@@ -4031,8 +4032,8 @@
         </p:nvGrpSpPr>
         <p:grpSpPr>
           <a:xfrm>
-            <a:off x="9715770" y="4473744"/>
-            <a:ext cx="6563309" cy="875633"/>
+            <a:off x="9554818" y="3150465"/>
+            <a:ext cx="6724262" cy="875633"/>
             <a:chOff x="0" y="0"/>
             <a:chExt cx="8751079" cy="1167510"/>
           </a:xfrm>
@@ -4171,8 +4172,8 @@
         </p:nvGrpSpPr>
         <p:grpSpPr>
           <a:xfrm>
-            <a:off x="9715770" y="6889791"/>
-            <a:ext cx="6563309" cy="875633"/>
+            <a:off x="9581323" y="5433990"/>
+            <a:ext cx="6724262" cy="875633"/>
             <a:chOff x="0" y="0"/>
             <a:chExt cx="8751079" cy="1167510"/>
           </a:xfrm>
@@ -4285,31 +4286,13 @@
                 </a:spcBef>
               </a:pPr>
               <a:r>
-                <a:rPr lang="en-US" sz="3200" dirty="0" err="1" smtClean="0">
-                  <a:solidFill>
-                    <a:srgbClr val="000000"/>
-                  </a:solidFill>
-                  <a:latin typeface="DM Sans"/>
-                </a:rPr>
-                <a:t>Etat</a:t>
-              </a:r>
-              <a:r>
                 <a:rPr lang="en-US" sz="3200" dirty="0" smtClean="0">
                   <a:solidFill>
                     <a:srgbClr val="000000"/>
                   </a:solidFill>
                   <a:latin typeface="DM Sans"/>
                 </a:rPr>
-                <a:t> </a:t>
-              </a:r>
-              <a:r>
-                <a:rPr lang="en-US" sz="3200" dirty="0" err="1" smtClean="0">
-                  <a:solidFill>
-                    <a:srgbClr val="000000"/>
-                  </a:solidFill>
-                  <a:latin typeface="DM Sans"/>
-                </a:rPr>
-                <a:t>d’avancement</a:t>
+                <a:t>Conception</a:t>
               </a:r>
               <a:endParaRPr lang="en-US" sz="3200" dirty="0">
                 <a:solidFill>
@@ -4329,8 +4312,8 @@
         </p:nvGrpSpPr>
         <p:grpSpPr>
           <a:xfrm>
-            <a:off x="9715770" y="5606622"/>
-            <a:ext cx="6563309" cy="875633"/>
+            <a:off x="9554818" y="4283343"/>
+            <a:ext cx="6724262" cy="875633"/>
             <a:chOff x="0" y="0"/>
             <a:chExt cx="8751079" cy="1167510"/>
           </a:xfrm>
@@ -4469,8 +4452,8 @@
         </p:nvGrpSpPr>
         <p:grpSpPr>
           <a:xfrm>
-            <a:off x="9144000" y="3342579"/>
-            <a:ext cx="875703" cy="875703"/>
+            <a:off x="9122526" y="2019300"/>
+            <a:ext cx="897178" cy="875703"/>
             <a:chOff x="0" y="0"/>
             <a:chExt cx="1913890" cy="1913890"/>
           </a:xfrm>
@@ -4585,7 +4568,7 @@
         </p:nvGrpSpPr>
         <p:grpSpPr>
           <a:xfrm>
-            <a:off x="9144000" y="4473709"/>
+            <a:off x="9144000" y="3150430"/>
             <a:ext cx="875703" cy="875703"/>
             <a:chOff x="0" y="0"/>
             <a:chExt cx="1913890" cy="1913890"/>
@@ -4663,7 +4646,7 @@
         </p:nvGrpSpPr>
         <p:grpSpPr>
           <a:xfrm>
-            <a:off x="9113649" y="6889791"/>
+            <a:off x="9140154" y="5433990"/>
             <a:ext cx="875703" cy="875703"/>
             <a:chOff x="-1259" y="86806"/>
             <a:chExt cx="1913890" cy="1913890"/>
@@ -4748,7 +4731,7 @@
         </p:nvGrpSpPr>
         <p:grpSpPr>
           <a:xfrm>
-            <a:off x="9144000" y="5606587"/>
+            <a:off x="9144000" y="4283308"/>
             <a:ext cx="875703" cy="875703"/>
             <a:chOff x="0" y="0"/>
             <a:chExt cx="1913890" cy="1913890"/>
@@ -4826,9 +4809,9 @@
         </p:nvGrpSpPr>
         <p:grpSpPr>
           <a:xfrm>
-            <a:off x="609600" y="1020821"/>
+            <a:off x="265399" y="613546"/>
             <a:ext cx="5991211" cy="3452888"/>
-            <a:chOff x="0" y="0"/>
+            <a:chOff x="-458935" y="-543033"/>
             <a:chExt cx="7988281" cy="4603850"/>
           </a:xfrm>
         </p:grpSpPr>
@@ -4847,7 +4830,7 @@
                   <a14:useLocalDpi xmlns:a14="http://schemas.microsoft.com/office/drawing/2010/main" val="0"/>
                 </a:ext>
                 <a:ext uri="{96DAC541-7B7A-43D3-8B79-37D633B846F1}">
-                  <asvg:svgBlip xmlns:asvg="http://schemas.microsoft.com/office/drawing/2016/SVG/main" xmlns="" r:embed="rId3"/>
+                  <asvg:svgBlip xmlns="" xmlns:asvg="http://schemas.microsoft.com/office/drawing/2016/SVG/main" r:embed="rId3"/>
                 </a:ext>
               </a:extLst>
             </a:blip>
@@ -4858,7 +4841,7 @@
           </p:blipFill>
           <p:spPr>
             <a:xfrm>
-              <a:off x="0" y="0"/>
+              <a:off x="-458935" y="-543033"/>
               <a:ext cx="7988281" cy="4603850"/>
             </a:xfrm>
             <a:prstGeom prst="rect">
@@ -4926,7 +4909,7 @@
                 <a14:useLocalDpi xmlns:a14="http://schemas.microsoft.com/office/drawing/2010/main" val="0"/>
               </a:ext>
               <a:ext uri="{96DAC541-7B7A-43D3-8B79-37D633B846F1}">
-                <asvg:svgBlip xmlns:asvg="http://schemas.microsoft.com/office/drawing/2016/SVG/main" xmlns="" r:embed="rId5"/>
+                <asvg:svgBlip xmlns="" xmlns:asvg="http://schemas.microsoft.com/office/drawing/2016/SVG/main" r:embed="rId5"/>
               </a:ext>
             </a:extLst>
           </a:blip>
@@ -4953,7 +4936,7 @@
         </p:nvSpPr>
         <p:spPr>
           <a:xfrm>
-            <a:off x="9379481" y="3549818"/>
+            <a:off x="9379481" y="2247900"/>
             <a:ext cx="433316" cy="516616"/>
           </a:xfrm>
           <a:prstGeom prst="rect">
@@ -4997,7 +4980,7 @@
         </p:nvSpPr>
         <p:spPr>
           <a:xfrm>
-            <a:off x="9369956" y="4695235"/>
+            <a:off x="9369956" y="3371956"/>
             <a:ext cx="433316" cy="516616"/>
           </a:xfrm>
           <a:prstGeom prst="rect">
@@ -5041,8 +5024,8 @@
         </p:nvSpPr>
         <p:spPr>
           <a:xfrm>
-            <a:off x="9208600" y="7124700"/>
-            <a:ext cx="685800" cy="516616"/>
+            <a:off x="9218287" y="5668899"/>
+            <a:ext cx="702618" cy="516616"/>
           </a:xfrm>
           <a:prstGeom prst="rect">
             <a:avLst/>
@@ -5085,15 +5068,15 @@
         </p:nvSpPr>
         <p:spPr>
           <a:xfrm>
-            <a:off x="9334843" y="5813826"/>
-            <a:ext cx="433316" cy="516616"/>
+            <a:off x="9324217" y="4490547"/>
+            <a:ext cx="443942" cy="516616"/>
           </a:xfrm>
           <a:prstGeom prst="rect">
             <a:avLst/>
           </a:prstGeom>
         </p:spPr>
         <p:txBody>
-          <a:bodyPr lIns="0" tIns="0" rIns="0" bIns="0" rtlCol="0" anchor="t">
+          <a:bodyPr wrap="square" lIns="0" tIns="0" rIns="0" bIns="0" rtlCol="0" anchor="t">
             <a:spAutoFit/>
           </a:bodyPr>
           <a:lstStyle/>
@@ -5111,6 +5094,562 @@
                 <a:latin typeface="DM Sans Bold"/>
               </a:rPr>
               <a:t>III</a:t>
+            </a:r>
+            <a:endParaRPr lang="en-US" sz="3600" dirty="0">
+              <a:solidFill>
+                <a:srgbClr val="FFFFFF"/>
+              </a:solidFill>
+              <a:latin typeface="DM Sans Bold"/>
+            </a:endParaRPr>
+          </a:p>
+        </p:txBody>
+      </p:sp>
+      <p:grpSp>
+        <p:nvGrpSpPr>
+          <p:cNvPr id="35" name="Group 10"/>
+          <p:cNvGrpSpPr/>
+          <p:nvPr/>
+        </p:nvGrpSpPr>
+        <p:grpSpPr>
+          <a:xfrm>
+            <a:off x="9548192" y="6737180"/>
+            <a:ext cx="6724262" cy="875633"/>
+            <a:chOff x="0" y="0"/>
+            <a:chExt cx="8751079" cy="1167510"/>
+          </a:xfrm>
+        </p:grpSpPr>
+        <p:grpSp>
+          <p:nvGrpSpPr>
+            <p:cNvPr id="36" name="Group 11"/>
+            <p:cNvGrpSpPr/>
+            <p:nvPr/>
+          </p:nvGrpSpPr>
+          <p:grpSpPr>
+            <a:xfrm>
+              <a:off x="0" y="0"/>
+              <a:ext cx="8751079" cy="1167510"/>
+              <a:chOff x="0" y="0"/>
+              <a:chExt cx="14344420" cy="1913736"/>
+            </a:xfrm>
+          </p:grpSpPr>
+          <p:sp>
+            <p:nvSpPr>
+              <p:cNvPr id="38" name="Freeform 12"/>
+              <p:cNvSpPr/>
+              <p:nvPr/>
+            </p:nvSpPr>
+            <p:spPr>
+              <a:xfrm>
+                <a:off x="0" y="0"/>
+                <a:ext cx="14344421" cy="1913737"/>
+              </a:xfrm>
+              <a:custGeom>
+                <a:avLst/>
+                <a:gdLst/>
+                <a:ahLst/>
+                <a:cxnLst/>
+                <a:rect l="l" t="t" r="r" b="b"/>
+                <a:pathLst>
+                  <a:path w="14344421" h="1913737">
+                    <a:moveTo>
+                      <a:pt x="14219960" y="1913736"/>
+                    </a:moveTo>
+                    <a:lnTo>
+                      <a:pt x="124460" y="1913736"/>
+                    </a:lnTo>
+                    <a:cubicBezTo>
+                      <a:pt x="55880" y="1913736"/>
+                      <a:pt x="0" y="1857856"/>
+                      <a:pt x="0" y="1789276"/>
+                    </a:cubicBezTo>
+                    <a:lnTo>
+                      <a:pt x="0" y="124460"/>
+                    </a:lnTo>
+                    <a:cubicBezTo>
+                      <a:pt x="0" y="55880"/>
+                      <a:pt x="55880" y="0"/>
+                      <a:pt x="124460" y="0"/>
+                    </a:cubicBezTo>
+                    <a:lnTo>
+                      <a:pt x="14219960" y="0"/>
+                    </a:lnTo>
+                    <a:cubicBezTo>
+                      <a:pt x="14288540" y="0"/>
+                      <a:pt x="14344421" y="55880"/>
+                      <a:pt x="14344421" y="124460"/>
+                    </a:cubicBezTo>
+                    <a:lnTo>
+                      <a:pt x="14344421" y="1789277"/>
+                    </a:lnTo>
+                    <a:cubicBezTo>
+                      <a:pt x="14344421" y="1857857"/>
+                      <a:pt x="14288540" y="1913737"/>
+                      <a:pt x="14219960" y="1913737"/>
+                    </a:cubicBezTo>
+                    <a:close/>
+                  </a:path>
+                </a:pathLst>
+              </a:custGeom>
+              <a:solidFill>
+                <a:srgbClr val="E8E8E8"/>
+              </a:solidFill>
+            </p:spPr>
+          </p:sp>
+        </p:grpSp>
+        <p:sp>
+          <p:nvSpPr>
+            <p:cNvPr id="37" name="TextBox 13"/>
+            <p:cNvSpPr txBox="1"/>
+            <p:nvPr/>
+          </p:nvSpPr>
+          <p:spPr>
+            <a:xfrm>
+              <a:off x="682276" y="203719"/>
+              <a:ext cx="8068803" cy="733449"/>
+            </a:xfrm>
+            <a:prstGeom prst="rect">
+              <a:avLst/>
+            </a:prstGeom>
+          </p:spPr>
+          <p:txBody>
+            <a:bodyPr lIns="0" tIns="0" rIns="0" bIns="0" rtlCol="0" anchor="t">
+              <a:spAutoFit/>
+            </a:bodyPr>
+            <a:lstStyle/>
+            <a:p>
+              <a:pPr marL="0" lvl="0" indent="0" algn="l">
+                <a:lnSpc>
+                  <a:spcPts val="4480"/>
+                </a:lnSpc>
+                <a:spcBef>
+                  <a:spcPct val="0"/>
+                </a:spcBef>
+              </a:pPr>
+              <a:r>
+                <a:rPr lang="en-US" sz="3200" dirty="0" err="1" smtClean="0">
+                  <a:solidFill>
+                    <a:srgbClr val="000000"/>
+                  </a:solidFill>
+                  <a:latin typeface="DM Sans"/>
+                </a:rPr>
+                <a:t>Choix</a:t>
+              </a:r>
+              <a:r>
+                <a:rPr lang="en-US" sz="3200" dirty="0" smtClean="0">
+                  <a:solidFill>
+                    <a:srgbClr val="000000"/>
+                  </a:solidFill>
+                  <a:latin typeface="DM Sans"/>
+                </a:rPr>
+                <a:t> </a:t>
+              </a:r>
+              <a:r>
+                <a:rPr lang="en-US" sz="3200" dirty="0" err="1" smtClean="0">
+                  <a:solidFill>
+                    <a:srgbClr val="000000"/>
+                  </a:solidFill>
+                  <a:latin typeface="DM Sans"/>
+                </a:rPr>
+                <a:t>technologique</a:t>
+              </a:r>
+              <a:endParaRPr lang="en-US" sz="3200" dirty="0">
+                <a:solidFill>
+                  <a:srgbClr val="000000"/>
+                </a:solidFill>
+                <a:latin typeface="DM Sans"/>
+              </a:endParaRPr>
+            </a:p>
+          </p:txBody>
+        </p:sp>
+      </p:grpSp>
+      <p:grpSp>
+        <p:nvGrpSpPr>
+          <p:cNvPr id="39" name="Group 23"/>
+          <p:cNvGrpSpPr/>
+          <p:nvPr/>
+        </p:nvGrpSpPr>
+        <p:grpSpPr>
+          <a:xfrm>
+            <a:off x="9107023" y="6737180"/>
+            <a:ext cx="875703" cy="875703"/>
+            <a:chOff x="-1259" y="86806"/>
+            <a:chExt cx="1913890" cy="1913890"/>
+          </a:xfrm>
+        </p:grpSpPr>
+        <p:sp>
+          <p:nvSpPr>
+            <p:cNvPr id="40" name="Freeform 24"/>
+            <p:cNvSpPr/>
+            <p:nvPr/>
+          </p:nvSpPr>
+          <p:spPr>
+            <a:xfrm>
+              <a:off x="-1259" y="86806"/>
+              <a:ext cx="1913890" cy="1913890"/>
+            </a:xfrm>
+            <a:custGeom>
+              <a:avLst/>
+              <a:gdLst/>
+              <a:ahLst/>
+              <a:cxnLst/>
+              <a:rect l="l" t="t" r="r" b="b"/>
+              <a:pathLst>
+                <a:path w="1913890" h="1913890">
+                  <a:moveTo>
+                    <a:pt x="1789430" y="1913890"/>
+                  </a:moveTo>
+                  <a:lnTo>
+                    <a:pt x="124460" y="1913890"/>
+                  </a:lnTo>
+                  <a:cubicBezTo>
+                    <a:pt x="55880" y="1913890"/>
+                    <a:pt x="0" y="1858010"/>
+                    <a:pt x="0" y="1789430"/>
+                  </a:cubicBezTo>
+                  <a:lnTo>
+                    <a:pt x="0" y="124460"/>
+                  </a:lnTo>
+                  <a:cubicBezTo>
+                    <a:pt x="0" y="55880"/>
+                    <a:pt x="55880" y="0"/>
+                    <a:pt x="124460" y="0"/>
+                  </a:cubicBezTo>
+                  <a:lnTo>
+                    <a:pt x="1789430" y="0"/>
+                  </a:lnTo>
+                  <a:cubicBezTo>
+                    <a:pt x="1858010" y="0"/>
+                    <a:pt x="1913890" y="55880"/>
+                    <a:pt x="1913890" y="124460"/>
+                  </a:cubicBezTo>
+                  <a:lnTo>
+                    <a:pt x="1913890" y="1789430"/>
+                  </a:lnTo>
+                  <a:cubicBezTo>
+                    <a:pt x="1913890" y="1858010"/>
+                    <a:pt x="1858010" y="1913890"/>
+                    <a:pt x="1789430" y="1913890"/>
+                  </a:cubicBezTo>
+                  <a:close/>
+                </a:path>
+              </a:pathLst>
+            </a:custGeom>
+            <a:solidFill>
+              <a:srgbClr val="F89651"/>
+            </a:solidFill>
+          </p:spPr>
+          <p:txBody>
+            <a:bodyPr/>
+            <a:lstStyle/>
+            <a:p>
+              <a:endParaRPr lang="fr-FR" dirty="0"/>
+            </a:p>
+          </p:txBody>
+        </p:sp>
+      </p:grpSp>
+      <p:sp>
+        <p:nvSpPr>
+          <p:cNvPr id="41" name="TextBox 33"/>
+          <p:cNvSpPr txBox="1"/>
+          <p:nvPr/>
+        </p:nvSpPr>
+        <p:spPr>
+          <a:xfrm>
+            <a:off x="9185156" y="6972089"/>
+            <a:ext cx="702618" cy="516616"/>
+          </a:xfrm>
+          <a:prstGeom prst="rect">
+            <a:avLst/>
+          </a:prstGeom>
+        </p:spPr>
+        <p:txBody>
+          <a:bodyPr wrap="square" lIns="0" tIns="0" rIns="0" bIns="0" rtlCol="0" anchor="t">
+            <a:spAutoFit/>
+          </a:bodyPr>
+          <a:lstStyle/>
+          <a:p>
+            <a:pPr algn="ctr">
+              <a:lnSpc>
+                <a:spcPts val="3960"/>
+              </a:lnSpc>
+            </a:pPr>
+            <a:r>
+              <a:rPr lang="en-US" sz="3600" dirty="0">
+                <a:solidFill>
+                  <a:srgbClr val="FFFFFF"/>
+                </a:solidFill>
+                <a:latin typeface="DM Sans Bold"/>
+              </a:rPr>
+              <a:t>V</a:t>
+            </a:r>
+            <a:endParaRPr lang="en-US" sz="3600" dirty="0">
+              <a:solidFill>
+                <a:srgbClr val="FFFFFF"/>
+              </a:solidFill>
+              <a:latin typeface="DM Sans Bold"/>
+            </a:endParaRPr>
+          </a:p>
+        </p:txBody>
+      </p:sp>
+      <p:grpSp>
+        <p:nvGrpSpPr>
+          <p:cNvPr id="42" name="Group 10"/>
+          <p:cNvGrpSpPr/>
+          <p:nvPr/>
+        </p:nvGrpSpPr>
+        <p:grpSpPr>
+          <a:xfrm>
+            <a:off x="9581323" y="7909728"/>
+            <a:ext cx="6724262" cy="875633"/>
+            <a:chOff x="0" y="0"/>
+            <a:chExt cx="8751079" cy="1167510"/>
+          </a:xfrm>
+        </p:grpSpPr>
+        <p:grpSp>
+          <p:nvGrpSpPr>
+            <p:cNvPr id="43" name="Group 11"/>
+            <p:cNvGrpSpPr/>
+            <p:nvPr/>
+          </p:nvGrpSpPr>
+          <p:grpSpPr>
+            <a:xfrm>
+              <a:off x="0" y="0"/>
+              <a:ext cx="8751079" cy="1167510"/>
+              <a:chOff x="0" y="0"/>
+              <a:chExt cx="14344420" cy="1913736"/>
+            </a:xfrm>
+          </p:grpSpPr>
+          <p:sp>
+            <p:nvSpPr>
+              <p:cNvPr id="45" name="Freeform 12"/>
+              <p:cNvSpPr/>
+              <p:nvPr/>
+            </p:nvSpPr>
+            <p:spPr>
+              <a:xfrm>
+                <a:off x="0" y="0"/>
+                <a:ext cx="14344421" cy="1913737"/>
+              </a:xfrm>
+              <a:custGeom>
+                <a:avLst/>
+                <a:gdLst/>
+                <a:ahLst/>
+                <a:cxnLst/>
+                <a:rect l="l" t="t" r="r" b="b"/>
+                <a:pathLst>
+                  <a:path w="14344421" h="1913737">
+                    <a:moveTo>
+                      <a:pt x="14219960" y="1913736"/>
+                    </a:moveTo>
+                    <a:lnTo>
+                      <a:pt x="124460" y="1913736"/>
+                    </a:lnTo>
+                    <a:cubicBezTo>
+                      <a:pt x="55880" y="1913736"/>
+                      <a:pt x="0" y="1857856"/>
+                      <a:pt x="0" y="1789276"/>
+                    </a:cubicBezTo>
+                    <a:lnTo>
+                      <a:pt x="0" y="124460"/>
+                    </a:lnTo>
+                    <a:cubicBezTo>
+                      <a:pt x="0" y="55880"/>
+                      <a:pt x="55880" y="0"/>
+                      <a:pt x="124460" y="0"/>
+                    </a:cubicBezTo>
+                    <a:lnTo>
+                      <a:pt x="14219960" y="0"/>
+                    </a:lnTo>
+                    <a:cubicBezTo>
+                      <a:pt x="14288540" y="0"/>
+                      <a:pt x="14344421" y="55880"/>
+                      <a:pt x="14344421" y="124460"/>
+                    </a:cubicBezTo>
+                    <a:lnTo>
+                      <a:pt x="14344421" y="1789277"/>
+                    </a:lnTo>
+                    <a:cubicBezTo>
+                      <a:pt x="14344421" y="1857857"/>
+                      <a:pt x="14288540" y="1913737"/>
+                      <a:pt x="14219960" y="1913737"/>
+                    </a:cubicBezTo>
+                    <a:close/>
+                  </a:path>
+                </a:pathLst>
+              </a:custGeom>
+              <a:solidFill>
+                <a:srgbClr val="E8E8E8"/>
+              </a:solidFill>
+            </p:spPr>
+          </p:sp>
+        </p:grpSp>
+        <p:sp>
+          <p:nvSpPr>
+            <p:cNvPr id="44" name="TextBox 13"/>
+            <p:cNvSpPr txBox="1"/>
+            <p:nvPr/>
+          </p:nvSpPr>
+          <p:spPr>
+            <a:xfrm>
+              <a:off x="682276" y="203719"/>
+              <a:ext cx="8068803" cy="733449"/>
+            </a:xfrm>
+            <a:prstGeom prst="rect">
+              <a:avLst/>
+            </a:prstGeom>
+          </p:spPr>
+          <p:txBody>
+            <a:bodyPr lIns="0" tIns="0" rIns="0" bIns="0" rtlCol="0" anchor="t">
+              <a:spAutoFit/>
+            </a:bodyPr>
+            <a:lstStyle/>
+            <a:p>
+              <a:pPr marL="0" lvl="0" indent="0" algn="l">
+                <a:lnSpc>
+                  <a:spcPts val="4480"/>
+                </a:lnSpc>
+                <a:spcBef>
+                  <a:spcPct val="0"/>
+                </a:spcBef>
+              </a:pPr>
+              <a:r>
+                <a:rPr lang="en-US" sz="3200" dirty="0" err="1" smtClean="0">
+                  <a:solidFill>
+                    <a:srgbClr val="000000"/>
+                  </a:solidFill>
+                  <a:latin typeface="DM Sans"/>
+                </a:rPr>
+                <a:t>Démonstration</a:t>
+              </a:r>
+              <a:endParaRPr lang="en-US" sz="3200" dirty="0">
+                <a:solidFill>
+                  <a:srgbClr val="000000"/>
+                </a:solidFill>
+                <a:latin typeface="DM Sans"/>
+              </a:endParaRPr>
+            </a:p>
+          </p:txBody>
+        </p:sp>
+      </p:grpSp>
+      <p:grpSp>
+        <p:nvGrpSpPr>
+          <p:cNvPr id="46" name="Group 23"/>
+          <p:cNvGrpSpPr/>
+          <p:nvPr/>
+        </p:nvGrpSpPr>
+        <p:grpSpPr>
+          <a:xfrm>
+            <a:off x="9140154" y="7909728"/>
+            <a:ext cx="875703" cy="875703"/>
+            <a:chOff x="-1259" y="86806"/>
+            <a:chExt cx="1913890" cy="1913890"/>
+          </a:xfrm>
+        </p:grpSpPr>
+        <p:sp>
+          <p:nvSpPr>
+            <p:cNvPr id="47" name="Freeform 24"/>
+            <p:cNvSpPr/>
+            <p:nvPr/>
+          </p:nvSpPr>
+          <p:spPr>
+            <a:xfrm>
+              <a:off x="-1259" y="86806"/>
+              <a:ext cx="1913890" cy="1913890"/>
+            </a:xfrm>
+            <a:custGeom>
+              <a:avLst/>
+              <a:gdLst/>
+              <a:ahLst/>
+              <a:cxnLst/>
+              <a:rect l="l" t="t" r="r" b="b"/>
+              <a:pathLst>
+                <a:path w="1913890" h="1913890">
+                  <a:moveTo>
+                    <a:pt x="1789430" y="1913890"/>
+                  </a:moveTo>
+                  <a:lnTo>
+                    <a:pt x="124460" y="1913890"/>
+                  </a:lnTo>
+                  <a:cubicBezTo>
+                    <a:pt x="55880" y="1913890"/>
+                    <a:pt x="0" y="1858010"/>
+                    <a:pt x="0" y="1789430"/>
+                  </a:cubicBezTo>
+                  <a:lnTo>
+                    <a:pt x="0" y="124460"/>
+                  </a:lnTo>
+                  <a:cubicBezTo>
+                    <a:pt x="0" y="55880"/>
+                    <a:pt x="55880" y="0"/>
+                    <a:pt x="124460" y="0"/>
+                  </a:cubicBezTo>
+                  <a:lnTo>
+                    <a:pt x="1789430" y="0"/>
+                  </a:lnTo>
+                  <a:cubicBezTo>
+                    <a:pt x="1858010" y="0"/>
+                    <a:pt x="1913890" y="55880"/>
+                    <a:pt x="1913890" y="124460"/>
+                  </a:cubicBezTo>
+                  <a:lnTo>
+                    <a:pt x="1913890" y="1789430"/>
+                  </a:lnTo>
+                  <a:cubicBezTo>
+                    <a:pt x="1913890" y="1858010"/>
+                    <a:pt x="1858010" y="1913890"/>
+                    <a:pt x="1789430" y="1913890"/>
+                  </a:cubicBezTo>
+                  <a:close/>
+                </a:path>
+              </a:pathLst>
+            </a:custGeom>
+            <a:solidFill>
+              <a:srgbClr val="F89651"/>
+            </a:solidFill>
+          </p:spPr>
+          <p:txBody>
+            <a:bodyPr/>
+            <a:lstStyle/>
+            <a:p>
+              <a:endParaRPr lang="fr-FR" dirty="0"/>
+            </a:p>
+          </p:txBody>
+        </p:sp>
+      </p:grpSp>
+      <p:sp>
+        <p:nvSpPr>
+          <p:cNvPr id="48" name="TextBox 33"/>
+          <p:cNvSpPr txBox="1"/>
+          <p:nvPr/>
+        </p:nvSpPr>
+        <p:spPr>
+          <a:xfrm>
+            <a:off x="9218287" y="8144637"/>
+            <a:ext cx="702618" cy="516616"/>
+          </a:xfrm>
+          <a:prstGeom prst="rect">
+            <a:avLst/>
+          </a:prstGeom>
+        </p:spPr>
+        <p:txBody>
+          <a:bodyPr wrap="square" lIns="0" tIns="0" rIns="0" bIns="0" rtlCol="0" anchor="t">
+            <a:spAutoFit/>
+          </a:bodyPr>
+          <a:lstStyle/>
+          <a:p>
+            <a:pPr algn="ctr">
+              <a:lnSpc>
+                <a:spcPts val="3960"/>
+              </a:lnSpc>
+            </a:pPr>
+            <a:r>
+              <a:rPr lang="en-US" sz="3600" dirty="0" smtClean="0">
+                <a:solidFill>
+                  <a:srgbClr val="FFFFFF"/>
+                </a:solidFill>
+                <a:latin typeface="DM Sans Bold"/>
+              </a:rPr>
+              <a:t>VI</a:t>
             </a:r>
             <a:endParaRPr lang="en-US" sz="3600" dirty="0">
               <a:solidFill>
@@ -5142,6 +5681,1114 @@
 </file>
 
 <file path=ppt/slides/slide3.xml><?xml version="1.0" encoding="utf-8"?>
+<p:sld xmlns:a="http://schemas.openxmlformats.org/drawingml/2006/main" xmlns:r="http://schemas.openxmlformats.org/officeDocument/2006/relationships" xmlns:p="http://schemas.openxmlformats.org/presentationml/2006/main">
+  <p:cSld>
+    <p:spTree>
+      <p:nvGrpSpPr>
+        <p:cNvPr id="1" name=""/>
+        <p:cNvGrpSpPr/>
+        <p:nvPr/>
+      </p:nvGrpSpPr>
+      <p:grpSpPr>
+        <a:xfrm>
+          <a:off x="0" y="0"/>
+          <a:ext cx="0" cy="0"/>
+          <a:chOff x="0" y="0"/>
+          <a:chExt cx="0" cy="0"/>
+        </a:xfrm>
+      </p:grpSpPr>
+      <p:grpSp>
+        <p:nvGrpSpPr>
+          <p:cNvPr id="2" name="Group 2"/>
+          <p:cNvGrpSpPr/>
+          <p:nvPr/>
+        </p:nvGrpSpPr>
+        <p:grpSpPr>
+          <a:xfrm>
+            <a:off x="9715770" y="3342614"/>
+            <a:ext cx="7581630" cy="875633"/>
+            <a:chOff x="0" y="0"/>
+            <a:chExt cx="8751079" cy="1167510"/>
+          </a:xfrm>
+        </p:grpSpPr>
+        <p:grpSp>
+          <p:nvGrpSpPr>
+            <p:cNvPr id="3" name="Group 3"/>
+            <p:cNvGrpSpPr/>
+            <p:nvPr/>
+          </p:nvGrpSpPr>
+          <p:grpSpPr>
+            <a:xfrm>
+              <a:off x="0" y="0"/>
+              <a:ext cx="8751079" cy="1167510"/>
+              <a:chOff x="0" y="0"/>
+              <a:chExt cx="14344420" cy="1913736"/>
+            </a:xfrm>
+          </p:grpSpPr>
+          <p:sp>
+            <p:nvSpPr>
+              <p:cNvPr id="4" name="Freeform 4"/>
+              <p:cNvSpPr/>
+              <p:nvPr/>
+            </p:nvSpPr>
+            <p:spPr>
+              <a:xfrm>
+                <a:off x="0" y="0"/>
+                <a:ext cx="14344421" cy="1913737"/>
+              </a:xfrm>
+              <a:custGeom>
+                <a:avLst/>
+                <a:gdLst/>
+                <a:ahLst/>
+                <a:cxnLst/>
+                <a:rect l="l" t="t" r="r" b="b"/>
+                <a:pathLst>
+                  <a:path w="14344421" h="1913737">
+                    <a:moveTo>
+                      <a:pt x="14219960" y="1913736"/>
+                    </a:moveTo>
+                    <a:lnTo>
+                      <a:pt x="124460" y="1913736"/>
+                    </a:lnTo>
+                    <a:cubicBezTo>
+                      <a:pt x="55880" y="1913736"/>
+                      <a:pt x="0" y="1857856"/>
+                      <a:pt x="0" y="1789276"/>
+                    </a:cubicBezTo>
+                    <a:lnTo>
+                      <a:pt x="0" y="124460"/>
+                    </a:lnTo>
+                    <a:cubicBezTo>
+                      <a:pt x="0" y="55880"/>
+                      <a:pt x="55880" y="0"/>
+                      <a:pt x="124460" y="0"/>
+                    </a:cubicBezTo>
+                    <a:lnTo>
+                      <a:pt x="14219960" y="0"/>
+                    </a:lnTo>
+                    <a:cubicBezTo>
+                      <a:pt x="14288540" y="0"/>
+                      <a:pt x="14344421" y="55880"/>
+                      <a:pt x="14344421" y="124460"/>
+                    </a:cubicBezTo>
+                    <a:lnTo>
+                      <a:pt x="14344421" y="1789277"/>
+                    </a:lnTo>
+                    <a:cubicBezTo>
+                      <a:pt x="14344421" y="1857857"/>
+                      <a:pt x="14288540" y="1913737"/>
+                      <a:pt x="14219960" y="1913737"/>
+                    </a:cubicBezTo>
+                    <a:close/>
+                  </a:path>
+                </a:pathLst>
+              </a:custGeom>
+              <a:solidFill>
+                <a:srgbClr val="E8E8E8"/>
+              </a:solidFill>
+            </p:spPr>
+          </p:sp>
+        </p:grpSp>
+        <p:sp>
+          <p:nvSpPr>
+            <p:cNvPr id="5" name="TextBox 5"/>
+            <p:cNvSpPr txBox="1"/>
+            <p:nvPr/>
+          </p:nvSpPr>
+          <p:spPr>
+            <a:xfrm>
+              <a:off x="694976" y="158843"/>
+              <a:ext cx="6968338" cy="733449"/>
+            </a:xfrm>
+            <a:prstGeom prst="rect">
+              <a:avLst/>
+            </a:prstGeom>
+          </p:spPr>
+          <p:txBody>
+            <a:bodyPr lIns="0" tIns="0" rIns="0" bIns="0" rtlCol="0" anchor="t">
+              <a:spAutoFit/>
+            </a:bodyPr>
+            <a:lstStyle/>
+            <a:p>
+              <a:pPr marL="0" lvl="0" indent="0" algn="l">
+                <a:lnSpc>
+                  <a:spcPts val="4480"/>
+                </a:lnSpc>
+                <a:spcBef>
+                  <a:spcPct val="0"/>
+                </a:spcBef>
+              </a:pPr>
+              <a:r>
+                <a:rPr lang="en-US" sz="3200" dirty="0" smtClean="0">
+                  <a:solidFill>
+                    <a:srgbClr val="000000"/>
+                  </a:solidFill>
+                  <a:latin typeface="DM Sans"/>
+                </a:rPr>
+                <a:t>Le client </a:t>
+              </a:r>
+              <a:r>
+                <a:rPr lang="en-US" sz="3200" dirty="0" err="1" smtClean="0">
+                  <a:solidFill>
+                    <a:srgbClr val="000000"/>
+                  </a:solidFill>
+                  <a:latin typeface="DM Sans"/>
+                </a:rPr>
+                <a:t>perte</a:t>
+              </a:r>
+              <a:r>
+                <a:rPr lang="en-US" sz="3200" dirty="0" smtClean="0">
+                  <a:solidFill>
+                    <a:srgbClr val="000000"/>
+                  </a:solidFill>
+                  <a:latin typeface="DM Sans"/>
+                </a:rPr>
+                <a:t> du temps </a:t>
+              </a:r>
+              <a:endParaRPr lang="en-US" sz="3200" dirty="0">
+                <a:solidFill>
+                  <a:srgbClr val="000000"/>
+                </a:solidFill>
+                <a:latin typeface="DM Sans"/>
+              </a:endParaRPr>
+            </a:p>
+          </p:txBody>
+        </p:sp>
+      </p:grpSp>
+      <p:grpSp>
+        <p:nvGrpSpPr>
+          <p:cNvPr id="6" name="Group 6"/>
+          <p:cNvGrpSpPr/>
+          <p:nvPr/>
+        </p:nvGrpSpPr>
+        <p:grpSpPr>
+          <a:xfrm>
+            <a:off x="9715770" y="4473744"/>
+            <a:ext cx="7581630" cy="875633"/>
+            <a:chOff x="0" y="0"/>
+            <a:chExt cx="8751079" cy="1167510"/>
+          </a:xfrm>
+        </p:grpSpPr>
+        <p:grpSp>
+          <p:nvGrpSpPr>
+            <p:cNvPr id="7" name="Group 7"/>
+            <p:cNvGrpSpPr/>
+            <p:nvPr/>
+          </p:nvGrpSpPr>
+          <p:grpSpPr>
+            <a:xfrm>
+              <a:off x="0" y="0"/>
+              <a:ext cx="8751079" cy="1167510"/>
+              <a:chOff x="0" y="0"/>
+              <a:chExt cx="14344420" cy="1913736"/>
+            </a:xfrm>
+          </p:grpSpPr>
+          <p:sp>
+            <p:nvSpPr>
+              <p:cNvPr id="8" name="Freeform 8"/>
+              <p:cNvSpPr/>
+              <p:nvPr/>
+            </p:nvSpPr>
+            <p:spPr>
+              <a:xfrm>
+                <a:off x="0" y="0"/>
+                <a:ext cx="14344421" cy="1913737"/>
+              </a:xfrm>
+              <a:custGeom>
+                <a:avLst/>
+                <a:gdLst/>
+                <a:ahLst/>
+                <a:cxnLst/>
+                <a:rect l="l" t="t" r="r" b="b"/>
+                <a:pathLst>
+                  <a:path w="14344421" h="1913737">
+                    <a:moveTo>
+                      <a:pt x="14219960" y="1913736"/>
+                    </a:moveTo>
+                    <a:lnTo>
+                      <a:pt x="124460" y="1913736"/>
+                    </a:lnTo>
+                    <a:cubicBezTo>
+                      <a:pt x="55880" y="1913736"/>
+                      <a:pt x="0" y="1857856"/>
+                      <a:pt x="0" y="1789276"/>
+                    </a:cubicBezTo>
+                    <a:lnTo>
+                      <a:pt x="0" y="124460"/>
+                    </a:lnTo>
+                    <a:cubicBezTo>
+                      <a:pt x="0" y="55880"/>
+                      <a:pt x="55880" y="0"/>
+                      <a:pt x="124460" y="0"/>
+                    </a:cubicBezTo>
+                    <a:lnTo>
+                      <a:pt x="14219960" y="0"/>
+                    </a:lnTo>
+                    <a:cubicBezTo>
+                      <a:pt x="14288540" y="0"/>
+                      <a:pt x="14344421" y="55880"/>
+                      <a:pt x="14344421" y="124460"/>
+                    </a:cubicBezTo>
+                    <a:lnTo>
+                      <a:pt x="14344421" y="1789277"/>
+                    </a:lnTo>
+                    <a:cubicBezTo>
+                      <a:pt x="14344421" y="1857857"/>
+                      <a:pt x="14288540" y="1913737"/>
+                      <a:pt x="14219960" y="1913737"/>
+                    </a:cubicBezTo>
+                    <a:close/>
+                  </a:path>
+                </a:pathLst>
+              </a:custGeom>
+              <a:solidFill>
+                <a:srgbClr val="E8E8E8"/>
+              </a:solidFill>
+            </p:spPr>
+          </p:sp>
+        </p:grpSp>
+        <p:sp>
+          <p:nvSpPr>
+            <p:cNvPr id="9" name="TextBox 9"/>
+            <p:cNvSpPr txBox="1"/>
+            <p:nvPr/>
+          </p:nvSpPr>
+          <p:spPr>
+            <a:xfrm>
+              <a:off x="682276" y="203719"/>
+              <a:ext cx="8068803" cy="769441"/>
+            </a:xfrm>
+            <a:prstGeom prst="rect">
+              <a:avLst/>
+            </a:prstGeom>
+          </p:spPr>
+          <p:txBody>
+            <a:bodyPr lIns="0" tIns="0" rIns="0" bIns="0" rtlCol="0" anchor="t">
+              <a:spAutoFit/>
+            </a:bodyPr>
+            <a:lstStyle/>
+            <a:p>
+              <a:pPr marL="0" lvl="0" indent="0" algn="l">
+                <a:lnSpc>
+                  <a:spcPts val="4480"/>
+                </a:lnSpc>
+                <a:spcBef>
+                  <a:spcPct val="0"/>
+                </a:spcBef>
+              </a:pPr>
+              <a:r>
+                <a:rPr lang="en-US" sz="3200" dirty="0" err="1" smtClean="0">
+                  <a:solidFill>
+                    <a:srgbClr val="000000"/>
+                  </a:solidFill>
+                  <a:latin typeface="DM Sans"/>
+                </a:rPr>
+                <a:t>Mauvaise</a:t>
+              </a:r>
+              <a:r>
+                <a:rPr lang="en-US" sz="3200" dirty="0" smtClean="0">
+                  <a:solidFill>
+                    <a:srgbClr val="000000"/>
+                  </a:solidFill>
+                  <a:latin typeface="DM Sans"/>
+                </a:rPr>
+                <a:t> </a:t>
+              </a:r>
+              <a:r>
+                <a:rPr lang="en-US" sz="3200" dirty="0" err="1" smtClean="0">
+                  <a:solidFill>
+                    <a:srgbClr val="000000"/>
+                  </a:solidFill>
+                  <a:latin typeface="DM Sans"/>
+                </a:rPr>
+                <a:t>organisation</a:t>
+              </a:r>
+              <a:r>
+                <a:rPr lang="en-US" sz="3200" dirty="0" smtClean="0">
+                  <a:solidFill>
+                    <a:srgbClr val="000000"/>
+                  </a:solidFill>
+                  <a:latin typeface="DM Sans"/>
+                </a:rPr>
+                <a:t> du travail</a:t>
+              </a:r>
+              <a:endParaRPr lang="en-US" sz="3200" dirty="0">
+                <a:solidFill>
+                  <a:srgbClr val="000000"/>
+                </a:solidFill>
+                <a:latin typeface="DM Sans"/>
+              </a:endParaRPr>
+            </a:p>
+          </p:txBody>
+        </p:sp>
+      </p:grpSp>
+      <p:grpSp>
+        <p:nvGrpSpPr>
+          <p:cNvPr id="18" name="Group 18"/>
+          <p:cNvGrpSpPr/>
+          <p:nvPr/>
+        </p:nvGrpSpPr>
+        <p:grpSpPr>
+          <a:xfrm>
+            <a:off x="9144000" y="3342579"/>
+            <a:ext cx="875703" cy="875703"/>
+            <a:chOff x="0" y="0"/>
+            <a:chExt cx="1913890" cy="1913890"/>
+          </a:xfrm>
+        </p:grpSpPr>
+        <p:sp>
+          <p:nvSpPr>
+            <p:cNvPr id="19" name="Freeform 19"/>
+            <p:cNvSpPr/>
+            <p:nvPr/>
+          </p:nvSpPr>
+          <p:spPr>
+            <a:xfrm>
+              <a:off x="0" y="0"/>
+              <a:ext cx="1913890" cy="1913890"/>
+            </a:xfrm>
+            <a:custGeom>
+              <a:avLst/>
+              <a:gdLst/>
+              <a:ahLst/>
+              <a:cxnLst/>
+              <a:rect l="l" t="t" r="r" b="b"/>
+              <a:pathLst>
+                <a:path w="1913890" h="1913890">
+                  <a:moveTo>
+                    <a:pt x="1789430" y="1913890"/>
+                  </a:moveTo>
+                  <a:lnTo>
+                    <a:pt x="124460" y="1913890"/>
+                  </a:lnTo>
+                  <a:cubicBezTo>
+                    <a:pt x="55880" y="1913890"/>
+                    <a:pt x="0" y="1858010"/>
+                    <a:pt x="0" y="1789430"/>
+                  </a:cubicBezTo>
+                  <a:lnTo>
+                    <a:pt x="0" y="124460"/>
+                  </a:lnTo>
+                  <a:cubicBezTo>
+                    <a:pt x="0" y="55880"/>
+                    <a:pt x="55880" y="0"/>
+                    <a:pt x="124460" y="0"/>
+                  </a:cubicBezTo>
+                  <a:lnTo>
+                    <a:pt x="1789430" y="0"/>
+                  </a:lnTo>
+                  <a:cubicBezTo>
+                    <a:pt x="1858010" y="0"/>
+                    <a:pt x="1913890" y="55880"/>
+                    <a:pt x="1913890" y="124460"/>
+                  </a:cubicBezTo>
+                  <a:lnTo>
+                    <a:pt x="1913890" y="1789430"/>
+                  </a:lnTo>
+                  <a:cubicBezTo>
+                    <a:pt x="1913890" y="1858010"/>
+                    <a:pt x="1858010" y="1913890"/>
+                    <a:pt x="1789430" y="1913890"/>
+                  </a:cubicBezTo>
+                  <a:close/>
+                </a:path>
+              </a:pathLst>
+            </a:custGeom>
+            <a:solidFill>
+              <a:srgbClr val="F89651"/>
+            </a:solidFill>
+          </p:spPr>
+        </p:sp>
+      </p:grpSp>
+      <p:sp>
+        <p:nvSpPr>
+          <p:cNvPr id="20" name="TextBox 20"/>
+          <p:cNvSpPr txBox="1"/>
+          <p:nvPr/>
+        </p:nvSpPr>
+        <p:spPr>
+          <a:xfrm>
+            <a:off x="9551501" y="5232661"/>
+            <a:ext cx="433316" cy="499325"/>
+          </a:xfrm>
+          <a:prstGeom prst="rect">
+            <a:avLst/>
+          </a:prstGeom>
+        </p:spPr>
+        <p:txBody>
+          <a:bodyPr lIns="0" tIns="0" rIns="0" bIns="0" rtlCol="0" anchor="t">
+            <a:spAutoFit/>
+          </a:bodyPr>
+          <a:lstStyle/>
+          <a:p>
+            <a:pPr algn="ctr">
+              <a:lnSpc>
+                <a:spcPts val="3960"/>
+              </a:lnSpc>
+            </a:pPr>
+            <a:r>
+              <a:rPr lang="en-US" sz="3600">
+                <a:solidFill>
+                  <a:srgbClr val="FFFFFF"/>
+                </a:solidFill>
+                <a:latin typeface="DM Sans Bold"/>
+              </a:rPr>
+              <a:t>3</a:t>
+            </a:r>
+          </a:p>
+        </p:txBody>
+      </p:sp>
+      <p:grpSp>
+        <p:nvGrpSpPr>
+          <p:cNvPr id="21" name="Group 21"/>
+          <p:cNvGrpSpPr/>
+          <p:nvPr/>
+        </p:nvGrpSpPr>
+        <p:grpSpPr>
+          <a:xfrm>
+            <a:off x="9144000" y="4473709"/>
+            <a:ext cx="875703" cy="875703"/>
+            <a:chOff x="0" y="0"/>
+            <a:chExt cx="1913890" cy="1913890"/>
+          </a:xfrm>
+        </p:grpSpPr>
+        <p:sp>
+          <p:nvSpPr>
+            <p:cNvPr id="22" name="Freeform 22"/>
+            <p:cNvSpPr/>
+            <p:nvPr/>
+          </p:nvSpPr>
+          <p:spPr>
+            <a:xfrm>
+              <a:off x="0" y="0"/>
+              <a:ext cx="1913890" cy="1913890"/>
+            </a:xfrm>
+            <a:custGeom>
+              <a:avLst/>
+              <a:gdLst/>
+              <a:ahLst/>
+              <a:cxnLst/>
+              <a:rect l="l" t="t" r="r" b="b"/>
+              <a:pathLst>
+                <a:path w="1913890" h="1913890">
+                  <a:moveTo>
+                    <a:pt x="1789430" y="1913890"/>
+                  </a:moveTo>
+                  <a:lnTo>
+                    <a:pt x="124460" y="1913890"/>
+                  </a:lnTo>
+                  <a:cubicBezTo>
+                    <a:pt x="55880" y="1913890"/>
+                    <a:pt x="0" y="1858010"/>
+                    <a:pt x="0" y="1789430"/>
+                  </a:cubicBezTo>
+                  <a:lnTo>
+                    <a:pt x="0" y="124460"/>
+                  </a:lnTo>
+                  <a:cubicBezTo>
+                    <a:pt x="0" y="55880"/>
+                    <a:pt x="55880" y="0"/>
+                    <a:pt x="124460" y="0"/>
+                  </a:cubicBezTo>
+                  <a:lnTo>
+                    <a:pt x="1789430" y="0"/>
+                  </a:lnTo>
+                  <a:cubicBezTo>
+                    <a:pt x="1858010" y="0"/>
+                    <a:pt x="1913890" y="55880"/>
+                    <a:pt x="1913890" y="124460"/>
+                  </a:cubicBezTo>
+                  <a:lnTo>
+                    <a:pt x="1913890" y="1789430"/>
+                  </a:lnTo>
+                  <a:cubicBezTo>
+                    <a:pt x="1913890" y="1858010"/>
+                    <a:pt x="1858010" y="1913890"/>
+                    <a:pt x="1789430" y="1913890"/>
+                  </a:cubicBezTo>
+                  <a:close/>
+                </a:path>
+              </a:pathLst>
+            </a:custGeom>
+            <a:solidFill>
+              <a:srgbClr val="F89651"/>
+            </a:solidFill>
+          </p:spPr>
+        </p:sp>
+      </p:grpSp>
+      <p:grpSp>
+        <p:nvGrpSpPr>
+          <p:cNvPr id="27" name="Group 27"/>
+          <p:cNvGrpSpPr/>
+          <p:nvPr/>
+        </p:nvGrpSpPr>
+        <p:grpSpPr>
+          <a:xfrm>
+            <a:off x="641435" y="1020821"/>
+            <a:ext cx="8045365" cy="3452888"/>
+            <a:chOff x="0" y="0"/>
+            <a:chExt cx="7988281" cy="4603850"/>
+          </a:xfrm>
+        </p:grpSpPr>
+        <p:pic>
+          <p:nvPicPr>
+            <p:cNvPr id="28" name="Picture 28"/>
+            <p:cNvPicPr>
+              <a:picLocks noChangeAspect="1"/>
+            </p:cNvPicPr>
+            <p:nvPr/>
+          </p:nvPicPr>
+          <p:blipFill>
+            <a:blip r:embed="rId2">
+              <a:extLst>
+                <a:ext uri="{28A0092B-C50C-407E-A947-70E740481C1C}">
+                  <a14:useLocalDpi xmlns:a14="http://schemas.microsoft.com/office/drawing/2010/main" val="0"/>
+                </a:ext>
+                <a:ext uri="{96DAC541-7B7A-43D3-8B79-37D633B846F1}">
+                  <asvg:svgBlip xmlns="" xmlns:asvg="http://schemas.microsoft.com/office/drawing/2016/SVG/main" r:embed="rId3"/>
+                </a:ext>
+              </a:extLst>
+            </a:blip>
+            <a:srcRect t="3" b="3"/>
+            <a:stretch>
+              <a:fillRect/>
+            </a:stretch>
+          </p:blipFill>
+          <p:spPr>
+            <a:xfrm>
+              <a:off x="0" y="0"/>
+              <a:ext cx="7988281" cy="4603850"/>
+            </a:xfrm>
+            <a:prstGeom prst="rect">
+              <a:avLst/>
+            </a:prstGeom>
+          </p:spPr>
+        </p:pic>
+        <p:sp>
+          <p:nvSpPr>
+            <p:cNvPr id="29" name="TextBox 29"/>
+            <p:cNvSpPr txBox="1"/>
+            <p:nvPr/>
+          </p:nvSpPr>
+          <p:spPr>
+            <a:xfrm>
+              <a:off x="1678176" y="1320490"/>
+              <a:ext cx="4631928" cy="903153"/>
+            </a:xfrm>
+            <a:prstGeom prst="rect">
+              <a:avLst/>
+            </a:prstGeom>
+          </p:spPr>
+          <p:txBody>
+            <a:bodyPr lIns="0" tIns="0" rIns="0" bIns="0" rtlCol="0" anchor="t">
+              <a:spAutoFit/>
+            </a:bodyPr>
+            <a:lstStyle/>
+            <a:p>
+              <a:pPr>
+                <a:lnSpc>
+                  <a:spcPts val="5100"/>
+                </a:lnSpc>
+              </a:pPr>
+              <a:r>
+                <a:rPr lang="fr-FR" sz="5100" dirty="0" smtClean="0">
+                  <a:solidFill>
+                    <a:srgbClr val="FFFFFF"/>
+                  </a:solidFill>
+                  <a:latin typeface="DM Sans"/>
+                </a:rPr>
+                <a:t>Problématique</a:t>
+              </a:r>
+              <a:endParaRPr lang="fr-FR" sz="5100" dirty="0">
+                <a:solidFill>
+                  <a:srgbClr val="FFFFFF"/>
+                </a:solidFill>
+                <a:latin typeface="DM Sans"/>
+              </a:endParaRPr>
+            </a:p>
+          </p:txBody>
+        </p:sp>
+      </p:grpSp>
+      <p:pic>
+        <p:nvPicPr>
+          <p:cNvPr id="30" name="Picture 30"/>
+          <p:cNvPicPr>
+            <a:picLocks noChangeAspect="1"/>
+          </p:cNvPicPr>
+          <p:nvPr/>
+        </p:nvPicPr>
+        <p:blipFill>
+          <a:blip r:embed="rId4">
+            <a:extLst>
+              <a:ext uri="{28A0092B-C50C-407E-A947-70E740481C1C}">
+                <a14:useLocalDpi xmlns:a14="http://schemas.microsoft.com/office/drawing/2010/main" val="0"/>
+              </a:ext>
+              <a:ext uri="{96DAC541-7B7A-43D3-8B79-37D633B846F1}">
+                <asvg:svgBlip xmlns="" xmlns:asvg="http://schemas.microsoft.com/office/drawing/2016/SVG/main" r:embed="rId5"/>
+              </a:ext>
+            </a:extLst>
+          </a:blip>
+          <a:srcRect/>
+          <a:stretch>
+            <a:fillRect/>
+          </a:stretch>
+        </p:blipFill>
+        <p:spPr>
+          <a:xfrm>
+            <a:off x="641435" y="3780430"/>
+            <a:ext cx="2328416" cy="6216646"/>
+          </a:xfrm>
+          <a:prstGeom prst="rect">
+            <a:avLst/>
+          </a:prstGeom>
+        </p:spPr>
+      </p:pic>
+      <p:sp>
+        <p:nvSpPr>
+          <p:cNvPr id="31" name="TextBox 31"/>
+          <p:cNvSpPr txBox="1"/>
+          <p:nvPr/>
+        </p:nvSpPr>
+        <p:spPr>
+          <a:xfrm>
+            <a:off x="9379481" y="3549818"/>
+            <a:ext cx="433316" cy="516616"/>
+          </a:xfrm>
+          <a:prstGeom prst="rect">
+            <a:avLst/>
+          </a:prstGeom>
+        </p:spPr>
+        <p:txBody>
+          <a:bodyPr lIns="0" tIns="0" rIns="0" bIns="0" rtlCol="0" anchor="t">
+            <a:spAutoFit/>
+          </a:bodyPr>
+          <a:lstStyle/>
+          <a:p>
+            <a:pPr algn="ctr">
+              <a:lnSpc>
+                <a:spcPts val="3960"/>
+              </a:lnSpc>
+            </a:pPr>
+            <a:r>
+              <a:rPr lang="en-US" sz="3600" dirty="0" smtClean="0">
+                <a:solidFill>
+                  <a:srgbClr val="FFFFFF"/>
+                </a:solidFill>
+                <a:latin typeface="DM Sans Bold"/>
+              </a:rPr>
+              <a:t>I</a:t>
+            </a:r>
+            <a:endParaRPr lang="en-US" sz="3600" dirty="0">
+              <a:solidFill>
+                <a:srgbClr val="FFFFFF"/>
+              </a:solidFill>
+              <a:latin typeface="DM Sans Bold"/>
+            </a:endParaRPr>
+          </a:p>
+        </p:txBody>
+      </p:sp>
+      <p:sp>
+        <p:nvSpPr>
+          <p:cNvPr id="32" name="TextBox 32"/>
+          <p:cNvSpPr txBox="1"/>
+          <p:nvPr/>
+        </p:nvSpPr>
+        <p:spPr>
+          <a:xfrm>
+            <a:off x="9369956" y="4695235"/>
+            <a:ext cx="433316" cy="516616"/>
+          </a:xfrm>
+          <a:prstGeom prst="rect">
+            <a:avLst/>
+          </a:prstGeom>
+        </p:spPr>
+        <p:txBody>
+          <a:bodyPr lIns="0" tIns="0" rIns="0" bIns="0" rtlCol="0" anchor="t">
+            <a:spAutoFit/>
+          </a:bodyPr>
+          <a:lstStyle/>
+          <a:p>
+            <a:pPr algn="ctr">
+              <a:lnSpc>
+                <a:spcPts val="3960"/>
+              </a:lnSpc>
+            </a:pPr>
+            <a:r>
+              <a:rPr lang="en-US" sz="3600" dirty="0" smtClean="0">
+                <a:solidFill>
+                  <a:srgbClr val="FFFFFF"/>
+                </a:solidFill>
+                <a:latin typeface="DM Sans Bold"/>
+              </a:rPr>
+              <a:t>II</a:t>
+            </a:r>
+            <a:endParaRPr lang="en-US" sz="3600" dirty="0">
+              <a:solidFill>
+                <a:srgbClr val="FFFFFF"/>
+              </a:solidFill>
+              <a:latin typeface="DM Sans Bold"/>
+            </a:endParaRPr>
+          </a:p>
+        </p:txBody>
+      </p:sp>
+      <p:grpSp>
+        <p:nvGrpSpPr>
+          <p:cNvPr id="36" name="Groupe 35"/>
+          <p:cNvGrpSpPr/>
+          <p:nvPr/>
+        </p:nvGrpSpPr>
+        <p:grpSpPr>
+          <a:xfrm>
+            <a:off x="9127830" y="5829300"/>
+            <a:ext cx="8169570" cy="875703"/>
+            <a:chOff x="9127830" y="5829300"/>
+            <a:chExt cx="8169570" cy="875703"/>
+          </a:xfrm>
+        </p:grpSpPr>
+        <p:grpSp>
+          <p:nvGrpSpPr>
+            <p:cNvPr id="14" name="Group 14"/>
+            <p:cNvGrpSpPr/>
+            <p:nvPr/>
+          </p:nvGrpSpPr>
+          <p:grpSpPr>
+            <a:xfrm>
+              <a:off x="9594574" y="5829370"/>
+              <a:ext cx="7702826" cy="875633"/>
+              <a:chOff x="0" y="0"/>
+              <a:chExt cx="8751079" cy="1167510"/>
+            </a:xfrm>
+          </p:grpSpPr>
+          <p:grpSp>
+            <p:nvGrpSpPr>
+              <p:cNvPr id="15" name="Group 15"/>
+              <p:cNvGrpSpPr/>
+              <p:nvPr/>
+            </p:nvGrpSpPr>
+            <p:grpSpPr>
+              <a:xfrm>
+                <a:off x="0" y="0"/>
+                <a:ext cx="8751079" cy="1167510"/>
+                <a:chOff x="0" y="0"/>
+                <a:chExt cx="14344420" cy="1913736"/>
+              </a:xfrm>
+            </p:grpSpPr>
+            <p:sp>
+              <p:nvSpPr>
+                <p:cNvPr id="16" name="Freeform 16"/>
+                <p:cNvSpPr/>
+                <p:nvPr/>
+              </p:nvSpPr>
+              <p:spPr>
+                <a:xfrm>
+                  <a:off x="0" y="0"/>
+                  <a:ext cx="14344421" cy="1913737"/>
+                </a:xfrm>
+                <a:custGeom>
+                  <a:avLst/>
+                  <a:gdLst/>
+                  <a:ahLst/>
+                  <a:cxnLst/>
+                  <a:rect l="l" t="t" r="r" b="b"/>
+                  <a:pathLst>
+                    <a:path w="14344421" h="1913737">
+                      <a:moveTo>
+                        <a:pt x="14219960" y="1913736"/>
+                      </a:moveTo>
+                      <a:lnTo>
+                        <a:pt x="124460" y="1913736"/>
+                      </a:lnTo>
+                      <a:cubicBezTo>
+                        <a:pt x="55880" y="1913736"/>
+                        <a:pt x="0" y="1857856"/>
+                        <a:pt x="0" y="1789276"/>
+                      </a:cubicBezTo>
+                      <a:lnTo>
+                        <a:pt x="0" y="124460"/>
+                      </a:lnTo>
+                      <a:cubicBezTo>
+                        <a:pt x="0" y="55880"/>
+                        <a:pt x="55880" y="0"/>
+                        <a:pt x="124460" y="0"/>
+                      </a:cubicBezTo>
+                      <a:lnTo>
+                        <a:pt x="14219960" y="0"/>
+                      </a:lnTo>
+                      <a:cubicBezTo>
+                        <a:pt x="14288540" y="0"/>
+                        <a:pt x="14344421" y="55880"/>
+                        <a:pt x="14344421" y="124460"/>
+                      </a:cubicBezTo>
+                      <a:lnTo>
+                        <a:pt x="14344421" y="1789277"/>
+                      </a:lnTo>
+                      <a:cubicBezTo>
+                        <a:pt x="14344421" y="1857857"/>
+                        <a:pt x="14288540" y="1913737"/>
+                        <a:pt x="14219960" y="1913737"/>
+                      </a:cubicBezTo>
+                      <a:close/>
+                    </a:path>
+                  </a:pathLst>
+                </a:custGeom>
+                <a:solidFill>
+                  <a:srgbClr val="E8E8E8"/>
+                </a:solidFill>
+              </p:spPr>
+            </p:sp>
+          </p:grpSp>
+          <p:sp>
+            <p:nvSpPr>
+              <p:cNvPr id="17" name="TextBox 17"/>
+              <p:cNvSpPr txBox="1"/>
+              <p:nvPr/>
+            </p:nvSpPr>
+            <p:spPr>
+              <a:xfrm>
+                <a:off x="682276" y="203719"/>
+                <a:ext cx="8068803" cy="769441"/>
+              </a:xfrm>
+              <a:prstGeom prst="rect">
+                <a:avLst/>
+              </a:prstGeom>
+            </p:spPr>
+            <p:txBody>
+              <a:bodyPr lIns="0" tIns="0" rIns="0" bIns="0" rtlCol="0" anchor="t">
+                <a:spAutoFit/>
+              </a:bodyPr>
+              <a:lstStyle/>
+              <a:p>
+                <a:pPr marL="0" lvl="0" indent="0" algn="l">
+                  <a:lnSpc>
+                    <a:spcPts val="4480"/>
+                  </a:lnSpc>
+                  <a:spcBef>
+                    <a:spcPct val="0"/>
+                  </a:spcBef>
+                </a:pPr>
+                <a:r>
+                  <a:rPr lang="en-US" sz="3200" dirty="0" err="1" smtClean="0">
+                    <a:solidFill>
+                      <a:srgbClr val="000000"/>
+                    </a:solidFill>
+                    <a:latin typeface="DM Sans"/>
+                  </a:rPr>
+                  <a:t>M</a:t>
+                </a:r>
+                <a:r>
+                  <a:rPr lang="en-US" sz="3200" dirty="0" err="1" smtClean="0">
+                    <a:solidFill>
+                      <a:srgbClr val="000000"/>
+                    </a:solidFill>
+                    <a:latin typeface="DM Sans"/>
+                  </a:rPr>
+                  <a:t>anque</a:t>
+                </a:r>
+                <a:r>
+                  <a:rPr lang="en-US" sz="3200" dirty="0" smtClean="0">
+                    <a:solidFill>
+                      <a:srgbClr val="000000"/>
+                    </a:solidFill>
+                    <a:latin typeface="DM Sans"/>
+                  </a:rPr>
+                  <a:t> de la </a:t>
+                </a:r>
+                <a:r>
+                  <a:rPr lang="en-US" sz="3200" dirty="0" err="1" smtClean="0">
+                    <a:solidFill>
+                      <a:srgbClr val="000000"/>
+                    </a:solidFill>
+                    <a:latin typeface="DM Sans"/>
+                  </a:rPr>
+                  <a:t>diversité</a:t>
+                </a:r>
+                <a:r>
+                  <a:rPr lang="en-US" sz="3200" dirty="0" smtClean="0">
+                    <a:solidFill>
+                      <a:srgbClr val="000000"/>
+                    </a:solidFill>
+                    <a:latin typeface="DM Sans"/>
+                  </a:rPr>
+                  <a:t> des </a:t>
+                </a:r>
+                <a:r>
+                  <a:rPr lang="en-US" sz="3200" dirty="0" err="1" smtClean="0">
+                    <a:solidFill>
+                      <a:srgbClr val="000000"/>
+                    </a:solidFill>
+                    <a:latin typeface="DM Sans"/>
+                  </a:rPr>
+                  <a:t>offres</a:t>
+                </a:r>
+                <a:endParaRPr lang="en-US" sz="3200" dirty="0">
+                  <a:solidFill>
+                    <a:srgbClr val="000000"/>
+                  </a:solidFill>
+                  <a:latin typeface="DM Sans"/>
+                </a:endParaRPr>
+              </a:p>
+            </p:txBody>
+          </p:sp>
+        </p:grpSp>
+        <p:grpSp>
+          <p:nvGrpSpPr>
+            <p:cNvPr id="35" name="Groupe 34"/>
+            <p:cNvGrpSpPr/>
+            <p:nvPr/>
+          </p:nvGrpSpPr>
+          <p:grpSpPr>
+            <a:xfrm>
+              <a:off x="9127830" y="5829300"/>
+              <a:ext cx="891873" cy="875703"/>
+              <a:chOff x="9127830" y="5829300"/>
+              <a:chExt cx="891873" cy="875703"/>
+            </a:xfrm>
+          </p:grpSpPr>
+          <p:grpSp>
+            <p:nvGrpSpPr>
+              <p:cNvPr id="25" name="Group 25"/>
+              <p:cNvGrpSpPr/>
+              <p:nvPr/>
+            </p:nvGrpSpPr>
+            <p:grpSpPr>
+              <a:xfrm>
+                <a:off x="9127830" y="5829300"/>
+                <a:ext cx="891873" cy="875703"/>
+                <a:chOff x="0" y="0"/>
+                <a:chExt cx="1913890" cy="1913890"/>
+              </a:xfrm>
+            </p:grpSpPr>
+            <p:sp>
+              <p:nvSpPr>
+                <p:cNvPr id="26" name="Freeform 26"/>
+                <p:cNvSpPr/>
+                <p:nvPr/>
+              </p:nvSpPr>
+              <p:spPr>
+                <a:xfrm>
+                  <a:off x="0" y="0"/>
+                  <a:ext cx="1913890" cy="1913890"/>
+                </a:xfrm>
+                <a:custGeom>
+                  <a:avLst/>
+                  <a:gdLst/>
+                  <a:ahLst/>
+                  <a:cxnLst/>
+                  <a:rect l="l" t="t" r="r" b="b"/>
+                  <a:pathLst>
+                    <a:path w="1913890" h="1913890">
+                      <a:moveTo>
+                        <a:pt x="1789430" y="1913890"/>
+                      </a:moveTo>
+                      <a:lnTo>
+                        <a:pt x="124460" y="1913890"/>
+                      </a:lnTo>
+                      <a:cubicBezTo>
+                        <a:pt x="55880" y="1913890"/>
+                        <a:pt x="0" y="1858010"/>
+                        <a:pt x="0" y="1789430"/>
+                      </a:cubicBezTo>
+                      <a:lnTo>
+                        <a:pt x="0" y="124460"/>
+                      </a:lnTo>
+                      <a:cubicBezTo>
+                        <a:pt x="0" y="55880"/>
+                        <a:pt x="55880" y="0"/>
+                        <a:pt x="124460" y="0"/>
+                      </a:cubicBezTo>
+                      <a:lnTo>
+                        <a:pt x="1789430" y="0"/>
+                      </a:lnTo>
+                      <a:cubicBezTo>
+                        <a:pt x="1858010" y="0"/>
+                        <a:pt x="1913890" y="55880"/>
+                        <a:pt x="1913890" y="124460"/>
+                      </a:cubicBezTo>
+                      <a:lnTo>
+                        <a:pt x="1913890" y="1789430"/>
+                      </a:lnTo>
+                      <a:cubicBezTo>
+                        <a:pt x="1913890" y="1858010"/>
+                        <a:pt x="1858010" y="1913890"/>
+                        <a:pt x="1789430" y="1913890"/>
+                      </a:cubicBezTo>
+                      <a:close/>
+                    </a:path>
+                  </a:pathLst>
+                </a:custGeom>
+                <a:solidFill>
+                  <a:srgbClr val="F89651"/>
+                </a:solidFill>
+              </p:spPr>
+            </p:sp>
+          </p:grpSp>
+          <p:sp>
+            <p:nvSpPr>
+              <p:cNvPr id="33" name="TextBox 33"/>
+              <p:cNvSpPr txBox="1"/>
+              <p:nvPr/>
+            </p:nvSpPr>
+            <p:spPr>
+              <a:xfrm>
+                <a:off x="9208600" y="6057900"/>
+                <a:ext cx="685800" cy="516616"/>
+              </a:xfrm>
+              <a:prstGeom prst="rect">
+                <a:avLst/>
+              </a:prstGeom>
+            </p:spPr>
+            <p:txBody>
+              <a:bodyPr wrap="square" lIns="0" tIns="0" rIns="0" bIns="0" rtlCol="0" anchor="t">
+                <a:spAutoFit/>
+              </a:bodyPr>
+              <a:lstStyle/>
+              <a:p>
+                <a:pPr algn="ctr">
+                  <a:lnSpc>
+                    <a:spcPts val="3960"/>
+                  </a:lnSpc>
+                </a:pPr>
+                <a:r>
+                  <a:rPr lang="en-US" sz="3600" dirty="0" smtClean="0">
+                    <a:solidFill>
+                      <a:srgbClr val="FFFFFF"/>
+                    </a:solidFill>
+                    <a:latin typeface="DM Sans Bold"/>
+                  </a:rPr>
+                  <a:t>III</a:t>
+                </a:r>
+                <a:endParaRPr lang="en-US" sz="3600" dirty="0">
+                  <a:solidFill>
+                    <a:srgbClr val="FFFFFF"/>
+                  </a:solidFill>
+                  <a:latin typeface="DM Sans Bold"/>
+                </a:endParaRPr>
+              </a:p>
+            </p:txBody>
+          </p:sp>
+        </p:grpSp>
+      </p:grpSp>
+    </p:spTree>
+    <p:extLst>
+      <p:ext uri="{BB962C8B-B14F-4D97-AF65-F5344CB8AC3E}">
+        <p14:creationId xmlns:p14="http://schemas.microsoft.com/office/powerpoint/2010/main" val="1119238946"/>
+      </p:ext>
+    </p:extLst>
+  </p:cSld>
+  <p:clrMapOvr>
+    <a:masterClrMapping/>
+  </p:clrMapOvr>
+  <p:timing>
+    <p:tnLst>
+      <p:par>
+        <p:cTn id="1" dur="indefinite" restart="never" nodeType="tmRoot"/>
+      </p:par>
+    </p:tnLst>
+  </p:timing>
+</p:sld>
+</file>
+
+<file path=ppt/slides/slide4.xml><?xml version="1.0" encoding="utf-8"?>
 <p:sld xmlns:a="http://schemas.openxmlformats.org/drawingml/2006/main" xmlns:r="http://schemas.openxmlformats.org/officeDocument/2006/relationships" xmlns:p="http://schemas.openxmlformats.org/presentationml/2006/main">
   <p:cSld>
     <p:spTree>
@@ -5368,31 +7015,6 @@
           </a:prstGeom>
         </p:spPr>
       </p:pic>
-      <p:pic>
-        <p:nvPicPr>
-          <p:cNvPr id="8" name="Picture 8"/>
-          <p:cNvPicPr>
-            <a:picLocks noChangeAspect="1"/>
-          </p:cNvPicPr>
-          <p:nvPr/>
-        </p:nvPicPr>
-        <p:blipFill>
-          <a:blip r:embed="rId4"/>
-          <a:srcRect/>
-          <a:stretch>
-            <a:fillRect/>
-          </a:stretch>
-        </p:blipFill>
-        <p:spPr>
-          <a:xfrm>
-            <a:off x="5943600" y="419100"/>
-            <a:ext cx="6386982" cy="3991864"/>
-          </a:xfrm>
-          <a:prstGeom prst="rect">
-            <a:avLst/>
-          </a:prstGeom>
-        </p:spPr>
-      </p:pic>
       <p:sp>
         <p:nvSpPr>
           <p:cNvPr id="9" name="TextBox 9"/>
@@ -5467,13 +7089,13 @@
               <a:t>un </a:t>
             </a:r>
             <a:r>
-              <a:rPr lang="en-US" sz="2800" dirty="0" err="1">
+              <a:rPr lang="en-US" sz="2800" dirty="0" smtClean="0">
                 <a:solidFill>
                   <a:srgbClr val="000000"/>
                 </a:solidFill>
                 <a:latin typeface="DM Sans"/>
               </a:rPr>
-              <a:t>clientt</a:t>
+              <a:t>client</a:t>
             </a:r>
             <a:endParaRPr lang="en-US" sz="2800" dirty="0">
               <a:solidFill>
@@ -5484,92 +7106,210 @@
           </a:p>
         </p:txBody>
       </p:sp>
-      <p:sp>
-        <p:nvSpPr>
-          <p:cNvPr id="11" name="TextBox 11"/>
-          <p:cNvSpPr txBox="1"/>
+      <p:grpSp>
+        <p:nvGrpSpPr>
+          <p:cNvPr id="12" name="Groupe 11"/>
+          <p:cNvGrpSpPr/>
           <p:nvPr/>
-        </p:nvSpPr>
+        </p:nvGrpSpPr>
+        <p:grpSpPr>
+          <a:xfrm>
+            <a:off x="5943600" y="1771828"/>
+            <a:ext cx="6386982" cy="4209872"/>
+            <a:chOff x="5943600" y="419100"/>
+            <a:chExt cx="6386982" cy="4209872"/>
+          </a:xfrm>
+        </p:grpSpPr>
+        <p:pic>
+          <p:nvPicPr>
+            <p:cNvPr id="8" name="Picture 8"/>
+            <p:cNvPicPr>
+              <a:picLocks noChangeAspect="1"/>
+            </p:cNvPicPr>
+            <p:nvPr/>
+          </p:nvPicPr>
+          <p:blipFill>
+            <a:blip r:embed="rId4"/>
+            <a:srcRect/>
+            <a:stretch>
+              <a:fillRect/>
+            </a:stretch>
+          </p:blipFill>
+          <p:spPr>
+            <a:xfrm>
+              <a:off x="5943600" y="419100"/>
+              <a:ext cx="6386982" cy="3991864"/>
+            </a:xfrm>
+            <a:prstGeom prst="rect">
+              <a:avLst/>
+            </a:prstGeom>
+          </p:spPr>
+        </p:pic>
+        <p:sp>
+          <p:nvSpPr>
+            <p:cNvPr id="11" name="TextBox 11"/>
+            <p:cNvSpPr txBox="1"/>
+            <p:nvPr/>
+          </p:nvSpPr>
+          <p:spPr>
+            <a:xfrm>
+              <a:off x="6957338" y="4192955"/>
+              <a:ext cx="4025581" cy="436017"/>
+            </a:xfrm>
+            <a:prstGeom prst="rect">
+              <a:avLst/>
+            </a:prstGeom>
+          </p:spPr>
+          <p:txBody>
+            <a:bodyPr wrap="square" lIns="0" tIns="0" rIns="0" bIns="0" rtlCol="0" anchor="t">
+              <a:spAutoFit/>
+            </a:bodyPr>
+            <a:lstStyle/>
+            <a:p>
+              <a:pPr algn="ctr">
+                <a:lnSpc>
+                  <a:spcPts val="3359"/>
+                </a:lnSpc>
+                <a:spcBef>
+                  <a:spcPct val="0"/>
+                </a:spcBef>
+              </a:pPr>
+              <a:r>
+                <a:rPr lang="en-US" sz="2400" dirty="0">
+                  <a:solidFill>
+                    <a:srgbClr val="000000"/>
+                  </a:solidFill>
+                  <a:latin typeface="DM Sans"/>
+                </a:rPr>
+                <a:t>La platform </a:t>
+              </a:r>
+              <a:r>
+                <a:rPr lang="en-US" sz="2400" dirty="0" smtClean="0">
+                  <a:solidFill>
+                    <a:srgbClr val="000000"/>
+                  </a:solidFill>
+                  <a:latin typeface="DM Sans"/>
+                </a:rPr>
+                <a:t>“Salon </a:t>
+              </a:r>
+              <a:r>
+                <a:rPr lang="en-US" sz="2400" dirty="0" err="1">
+                  <a:solidFill>
+                    <a:srgbClr val="000000"/>
+                  </a:solidFill>
+                  <a:latin typeface="DM Sans"/>
+                </a:rPr>
+                <a:t>En</a:t>
+              </a:r>
+              <a:r>
+                <a:rPr lang="en-US" sz="2400" dirty="0">
+                  <a:solidFill>
+                    <a:srgbClr val="000000"/>
+                  </a:solidFill>
+                  <a:latin typeface="DM Sans"/>
+                </a:rPr>
+                <a:t> </a:t>
+              </a:r>
+              <a:r>
+                <a:rPr lang="en-US" sz="2400" dirty="0" err="1" smtClean="0">
+                  <a:solidFill>
+                    <a:srgbClr val="000000"/>
+                  </a:solidFill>
+                  <a:latin typeface="DM Sans"/>
+                </a:rPr>
+                <a:t>ligne</a:t>
+              </a:r>
+              <a:r>
+                <a:rPr lang="en-US" sz="2400" dirty="0" smtClean="0">
+                  <a:solidFill>
+                    <a:srgbClr val="000000"/>
+                  </a:solidFill>
+                  <a:latin typeface="DM Sans"/>
+                </a:rPr>
+                <a:t>”</a:t>
+              </a:r>
+              <a:endParaRPr lang="en-US" sz="2400" dirty="0">
+                <a:solidFill>
+                  <a:srgbClr val="000000"/>
+                </a:solidFill>
+                <a:latin typeface="DM Sans"/>
+              </a:endParaRPr>
+            </a:p>
+          </p:txBody>
+        </p:sp>
+      </p:grpSp>
+      <p:pic>
+        <p:nvPicPr>
+          <p:cNvPr id="13" name="Picture 28"/>
+          <p:cNvPicPr>
+            <a:picLocks noChangeAspect="1"/>
+          </p:cNvPicPr>
+          <p:nvPr/>
+        </p:nvPicPr>
+        <p:blipFill>
+          <a:blip r:embed="rId5">
+            <a:extLst>
+              <a:ext uri="{28A0092B-C50C-407E-A947-70E740481C1C}">
+                <a14:useLocalDpi xmlns:a14="http://schemas.microsoft.com/office/drawing/2010/main" val="0"/>
+              </a:ext>
+              <a:ext uri="{96DAC541-7B7A-43D3-8B79-37D633B846F1}">
+                <asvg:svgBlip xmlns="" xmlns:asvg="http://schemas.microsoft.com/office/drawing/2016/SVG/main" r:embed="rId6"/>
+              </a:ext>
+            </a:extLst>
+          </a:blip>
+          <a:srcRect t="3" b="3"/>
+          <a:stretch>
+            <a:fillRect/>
+          </a:stretch>
+        </p:blipFill>
         <p:spPr>
           <a:xfrm>
-            <a:off x="6957338" y="4192955"/>
-            <a:ext cx="4025581" cy="436017"/>
+            <a:off x="318947" y="444454"/>
+            <a:ext cx="6673765" cy="2864228"/>
           </a:xfrm>
           <a:prstGeom prst="rect">
             <a:avLst/>
           </a:prstGeom>
         </p:spPr>
+      </p:pic>
+      <p:sp>
+        <p:nvSpPr>
+          <p:cNvPr id="14" name="TextBox 29"/>
+          <p:cNvSpPr txBox="1"/>
+          <p:nvPr/>
+        </p:nvSpPr>
+        <p:spPr>
+          <a:xfrm>
+            <a:off x="1914701" y="1094463"/>
+            <a:ext cx="3869719" cy="677365"/>
+          </a:xfrm>
+          <a:prstGeom prst="rect">
+            <a:avLst/>
+          </a:prstGeom>
+        </p:spPr>
         <p:txBody>
           <a:bodyPr wrap="square" lIns="0" tIns="0" rIns="0" bIns="0" rtlCol="0" anchor="t">
             <a:spAutoFit/>
           </a:bodyPr>
           <a:lstStyle/>
           <a:p>
-            <a:pPr algn="ctr">
+            <a:pPr>
               <a:lnSpc>
-                <a:spcPts val="3359"/>
+                <a:spcPts val="5100"/>
               </a:lnSpc>
-              <a:spcBef>
-                <a:spcPct val="0"/>
-              </a:spcBef>
             </a:pPr>
             <a:r>
-              <a:rPr lang="en-US" sz="2400" dirty="0">
+              <a:rPr lang="fr-FR" sz="5100" dirty="0" smtClean="0">
                 <a:solidFill>
-                  <a:srgbClr val="000000"/>
+                  <a:srgbClr val="FFFFFF"/>
                 </a:solidFill>
                 <a:latin typeface="DM Sans"/>
               </a:rPr>
-              <a:t>La platform </a:t>
-            </a:r>
-            <a:r>
-              <a:rPr lang="en-US" sz="2400" dirty="0" smtClean="0">
-                <a:solidFill>
-                  <a:srgbClr val="000000"/>
-                </a:solidFill>
-                <a:latin typeface="DM Sans"/>
-              </a:rPr>
-              <a:t>“Salon </a:t>
-            </a:r>
-            <a:r>
-              <a:rPr lang="en-US" sz="2400" dirty="0" err="1">
-                <a:solidFill>
-                  <a:srgbClr val="000000"/>
-                </a:solidFill>
-                <a:latin typeface="DM Sans"/>
-              </a:rPr>
-              <a:t>En</a:t>
-            </a:r>
-            <a:r>
-              <a:rPr lang="en-US" sz="2400" dirty="0">
-                <a:solidFill>
-                  <a:srgbClr val="000000"/>
-                </a:solidFill>
-                <a:latin typeface="DM Sans"/>
-              </a:rPr>
-              <a:t> </a:t>
-            </a:r>
-            <a:r>
-              <a:rPr lang="en-US" sz="2400" dirty="0" err="1" smtClean="0">
-                <a:solidFill>
-                  <a:srgbClr val="000000"/>
-                </a:solidFill>
-                <a:latin typeface="DM Sans"/>
-              </a:rPr>
-              <a:t>ligne</a:t>
-            </a:r>
-            <a:r>
-              <a:rPr lang="en-US" sz="2400" dirty="0" smtClean="0">
-                <a:solidFill>
-                  <a:srgbClr val="000000"/>
-                </a:solidFill>
-                <a:latin typeface="DM Sans"/>
-              </a:rPr>
-              <a:t>”</a:t>
-            </a:r>
-            <a:endParaRPr lang="en-US" sz="2400" dirty="0">
+              <a:t>Solution</a:t>
+            </a:r>
+            <a:endParaRPr lang="fr-FR" sz="5100" dirty="0">
               <a:solidFill>
-                <a:srgbClr val="000000"/>
+                <a:srgbClr val="FFFFFF"/>
               </a:solidFill>
               <a:latin typeface="DM Sans"/>
             </a:endParaRPr>
@@ -5591,7 +7331,7 @@
 </p:sld>
 </file>
 
-<file path=ppt/slides/slide4.xml><?xml version="1.0" encoding="utf-8"?>
+<file path=ppt/slides/slide5.xml><?xml version="1.0" encoding="utf-8"?>
 <p:sld xmlns:a="http://schemas.openxmlformats.org/drawingml/2006/main" xmlns:r="http://schemas.openxmlformats.org/officeDocument/2006/relationships" xmlns:p="http://schemas.openxmlformats.org/presentationml/2006/main">
   <p:cSld>
     <p:spTree>
@@ -6365,7 +8105,7 @@
                   <a14:useLocalDpi xmlns:a14="http://schemas.microsoft.com/office/drawing/2010/main" val="0"/>
                 </a:ext>
                 <a:ext uri="{96DAC541-7B7A-43D3-8B79-37D633B846F1}">
-                  <asvg:svgBlip xmlns:asvg="http://schemas.microsoft.com/office/drawing/2016/SVG/main" xmlns="" r:embed="rId3"/>
+                  <asvg:svgBlip xmlns="" xmlns:asvg="http://schemas.microsoft.com/office/drawing/2016/SVG/main" r:embed="rId3"/>
                 </a:ext>
               </a:extLst>
             </a:blip>
@@ -6462,7 +8202,7 @@
                 <a14:useLocalDpi xmlns:a14="http://schemas.microsoft.com/office/drawing/2010/main" val="0"/>
               </a:ext>
               <a:ext uri="{96DAC541-7B7A-43D3-8B79-37D633B846F1}">
-                <asvg:svgBlip xmlns:asvg="http://schemas.microsoft.com/office/drawing/2016/SVG/main" xmlns="" r:embed="rId5"/>
+                <asvg:svgBlip xmlns="" xmlns:asvg="http://schemas.microsoft.com/office/drawing/2016/SVG/main" r:embed="rId5"/>
               </a:ext>
             </a:extLst>
           </a:blip>
@@ -6940,7 +8680,7 @@
 </p:sld>
 </file>
 
-<file path=ppt/slides/slide5.xml><?xml version="1.0" encoding="utf-8"?>
+<file path=ppt/slides/slide6.xml><?xml version="1.0" encoding="utf-8"?>
 <p:sld xmlns:a="http://schemas.openxmlformats.org/drawingml/2006/main" xmlns:r="http://schemas.openxmlformats.org/officeDocument/2006/relationships" xmlns:p="http://schemas.openxmlformats.org/presentationml/2006/main">
   <p:cSld>
     <p:spTree>
@@ -7007,7 +8747,7 @@
 </p:sld>
 </file>
 
-<file path=ppt/slides/slide6.xml><?xml version="1.0" encoding="utf-8"?>
+<file path=ppt/slides/slide7.xml><?xml version="1.0" encoding="utf-8"?>
 <p:sld xmlns:a="http://schemas.openxmlformats.org/drawingml/2006/main" xmlns:r="http://schemas.openxmlformats.org/officeDocument/2006/relationships" xmlns:p="http://schemas.openxmlformats.org/presentationml/2006/main">
   <p:cSld>
     <p:spTree>
@@ -7068,7 +8808,7 @@
 </p:sld>
 </file>
 
-<file path=ppt/slides/slide7.xml><?xml version="1.0" encoding="utf-8"?>
+<file path=ppt/slides/slide8.xml><?xml version="1.0" encoding="utf-8"?>
 <p:sld xmlns:a="http://schemas.openxmlformats.org/drawingml/2006/main" xmlns:r="http://schemas.openxmlformats.org/officeDocument/2006/relationships" xmlns:p="http://schemas.openxmlformats.org/presentationml/2006/main">
   <p:cSld>
     <p:spTree>
@@ -7152,7 +8892,7 @@
                   <a14:useLocalDpi xmlns:a14="http://schemas.microsoft.com/office/drawing/2010/main" val="0"/>
                 </a:ext>
                 <a:ext uri="{96DAC541-7B7A-43D3-8B79-37D633B846F1}">
-                  <asvg:svgBlip xmlns:asvg="http://schemas.microsoft.com/office/drawing/2016/SVG/main" xmlns="" r:embed="rId4"/>
+                  <asvg:svgBlip xmlns="" xmlns:asvg="http://schemas.microsoft.com/office/drawing/2016/SVG/main" r:embed="rId4"/>
                 </a:ext>
               </a:extLst>
             </a:blip>

</xml_diff>